<commit_message>
Updates to mapping scripts
Exported best parameter set from MC data. Revised the mapping scripts for runs on ISU HPC.
</commit_message>
<xml_diff>
--- a/Figures/Fig2_QA_plots/Fig2_mockup.pptx
+++ b/Figures/Fig2_QA_plots/Fig2_mockup.pptx
@@ -270,7 +270,7 @@
           <a:p>
             <a:fld id="{5EF3D43F-D7C9-4FE1-93DA-2D63EE64CAFE}" type="datetimeFigureOut">
               <a:rPr lang="en-US" smtClean="0"/>
-              <a:t>8/19/2021</a:t>
+              <a:t>8/24/2021</a:t>
             </a:fld>
             <a:endParaRPr lang="en-US"/>
           </a:p>
@@ -468,7 +468,7 @@
           <a:p>
             <a:fld id="{5EF3D43F-D7C9-4FE1-93DA-2D63EE64CAFE}" type="datetimeFigureOut">
               <a:rPr lang="en-US" smtClean="0"/>
-              <a:t>8/19/2021</a:t>
+              <a:t>8/24/2021</a:t>
             </a:fld>
             <a:endParaRPr lang="en-US"/>
           </a:p>
@@ -676,7 +676,7 @@
           <a:p>
             <a:fld id="{5EF3D43F-D7C9-4FE1-93DA-2D63EE64CAFE}" type="datetimeFigureOut">
               <a:rPr lang="en-US" smtClean="0"/>
-              <a:t>8/19/2021</a:t>
+              <a:t>8/24/2021</a:t>
             </a:fld>
             <a:endParaRPr lang="en-US"/>
           </a:p>
@@ -874,7 +874,7 @@
           <a:p>
             <a:fld id="{5EF3D43F-D7C9-4FE1-93DA-2D63EE64CAFE}" type="datetimeFigureOut">
               <a:rPr lang="en-US" smtClean="0"/>
-              <a:t>8/19/2021</a:t>
+              <a:t>8/24/2021</a:t>
             </a:fld>
             <a:endParaRPr lang="en-US"/>
           </a:p>
@@ -1149,7 +1149,7 @@
           <a:p>
             <a:fld id="{5EF3D43F-D7C9-4FE1-93DA-2D63EE64CAFE}" type="datetimeFigureOut">
               <a:rPr lang="en-US" smtClean="0"/>
-              <a:t>8/19/2021</a:t>
+              <a:t>8/24/2021</a:t>
             </a:fld>
             <a:endParaRPr lang="en-US"/>
           </a:p>
@@ -1414,7 +1414,7 @@
           <a:p>
             <a:fld id="{5EF3D43F-D7C9-4FE1-93DA-2D63EE64CAFE}" type="datetimeFigureOut">
               <a:rPr lang="en-US" smtClean="0"/>
-              <a:t>8/19/2021</a:t>
+              <a:t>8/24/2021</a:t>
             </a:fld>
             <a:endParaRPr lang="en-US"/>
           </a:p>
@@ -1826,7 +1826,7 @@
           <a:p>
             <a:fld id="{5EF3D43F-D7C9-4FE1-93DA-2D63EE64CAFE}" type="datetimeFigureOut">
               <a:rPr lang="en-US" smtClean="0"/>
-              <a:t>8/19/2021</a:t>
+              <a:t>8/24/2021</a:t>
             </a:fld>
             <a:endParaRPr lang="en-US"/>
           </a:p>
@@ -1967,7 +1967,7 @@
           <a:p>
             <a:fld id="{5EF3D43F-D7C9-4FE1-93DA-2D63EE64CAFE}" type="datetimeFigureOut">
               <a:rPr lang="en-US" smtClean="0"/>
-              <a:t>8/19/2021</a:t>
+              <a:t>8/24/2021</a:t>
             </a:fld>
             <a:endParaRPr lang="en-US"/>
           </a:p>
@@ -2080,7 +2080,7 @@
           <a:p>
             <a:fld id="{5EF3D43F-D7C9-4FE1-93DA-2D63EE64CAFE}" type="datetimeFigureOut">
               <a:rPr lang="en-US" smtClean="0"/>
-              <a:t>8/19/2021</a:t>
+              <a:t>8/24/2021</a:t>
             </a:fld>
             <a:endParaRPr lang="en-US"/>
           </a:p>
@@ -2391,7 +2391,7 @@
           <a:p>
             <a:fld id="{5EF3D43F-D7C9-4FE1-93DA-2D63EE64CAFE}" type="datetimeFigureOut">
               <a:rPr lang="en-US" smtClean="0"/>
-              <a:t>8/19/2021</a:t>
+              <a:t>8/24/2021</a:t>
             </a:fld>
             <a:endParaRPr lang="en-US"/>
           </a:p>
@@ -2679,7 +2679,7 @@
           <a:p>
             <a:fld id="{5EF3D43F-D7C9-4FE1-93DA-2D63EE64CAFE}" type="datetimeFigureOut">
               <a:rPr lang="en-US" smtClean="0"/>
-              <a:t>8/19/2021</a:t>
+              <a:t>8/24/2021</a:t>
             </a:fld>
             <a:endParaRPr lang="en-US"/>
           </a:p>
@@ -2920,7 +2920,7 @@
           <a:p>
             <a:fld id="{5EF3D43F-D7C9-4FE1-93DA-2D63EE64CAFE}" type="datetimeFigureOut">
               <a:rPr lang="en-US" smtClean="0"/>
-              <a:t>8/19/2021</a:t>
+              <a:t>8/24/2021</a:t>
             </a:fld>
             <a:endParaRPr lang="en-US"/>
           </a:p>
@@ -3339,10 +3339,10 @@
       </p:grpSpPr>
       <p:grpSp>
         <p:nvGrpSpPr>
-          <p:cNvPr id="13" name="Group 12">
-            <a:extLst>
-              <a:ext uri="{FF2B5EF4-FFF2-40B4-BE49-F238E27FC236}">
-                <a16:creationId xmlns:a16="http://schemas.microsoft.com/office/drawing/2014/main" id="{EA6212DD-1CBF-41B5-9653-E2F46A97AB10}"/>
+          <p:cNvPr id="3" name="Group 2">
+            <a:extLst>
+              <a:ext uri="{FF2B5EF4-FFF2-40B4-BE49-F238E27FC236}">
+                <a16:creationId xmlns:a16="http://schemas.microsoft.com/office/drawing/2014/main" id="{031A170A-1131-43CA-BA9A-396E4A7E1C84}"/>
               </a:ext>
             </a:extLst>
           </p:cNvPr>
@@ -3351,193 +3351,18 @@
         </p:nvGrpSpPr>
         <p:grpSpPr>
           <a:xfrm>
-            <a:off x="2444261" y="426076"/>
-            <a:ext cx="6768166" cy="5812904"/>
-            <a:chOff x="2444261" y="426076"/>
-            <a:chExt cx="6768166" cy="5812904"/>
+            <a:off x="2444260" y="426076"/>
+            <a:ext cx="6768167" cy="5812904"/>
+            <a:chOff x="2444260" y="426076"/>
+            <a:chExt cx="6768167" cy="5812904"/>
           </a:xfrm>
         </p:grpSpPr>
-        <p:pic>
-          <p:nvPicPr>
-            <p:cNvPr id="6" name="Picture 5">
+        <p:grpSp>
+          <p:nvGrpSpPr>
+            <p:cNvPr id="13" name="Group 12">
               <a:extLst>
                 <a:ext uri="{FF2B5EF4-FFF2-40B4-BE49-F238E27FC236}">
-                  <a16:creationId xmlns:a16="http://schemas.microsoft.com/office/drawing/2014/main" id="{D6D8D7A7-F76C-4CE9-B531-69E784B2F128}"/>
-                </a:ext>
-              </a:extLst>
-            </p:cNvPr>
-            <p:cNvPicPr>
-              <a:picLocks noChangeAspect="1"/>
-            </p:cNvPicPr>
-            <p:nvPr/>
-          </p:nvPicPr>
-          <p:blipFill rotWithShape="1">
-            <a:blip r:embed="rId2">
-              <a:extLst>
-                <a:ext uri="{28A0092B-C50C-407E-A947-70E740481C1C}">
-                  <a14:useLocalDpi xmlns:a14="http://schemas.microsoft.com/office/drawing/2010/main" val="0"/>
-                </a:ext>
-              </a:extLst>
-            </a:blip>
-            <a:srcRect l="20507" t="50000" b="11625"/>
-            <a:stretch/>
-          </p:blipFill>
-          <p:spPr>
-            <a:xfrm>
-              <a:off x="2444261" y="3429000"/>
-              <a:ext cx="6541937" cy="2631830"/>
-            </a:xfrm>
-            <a:prstGeom prst="rect">
-              <a:avLst/>
-            </a:prstGeom>
-          </p:spPr>
-        </p:pic>
-        <p:pic>
-          <p:nvPicPr>
-            <p:cNvPr id="5" name="Picture 4">
-              <a:extLst>
-                <a:ext uri="{FF2B5EF4-FFF2-40B4-BE49-F238E27FC236}">
-                  <a16:creationId xmlns:a16="http://schemas.microsoft.com/office/drawing/2014/main" id="{BDC1BB22-F5E4-4324-AD23-19F6E80AED6A}"/>
-                </a:ext>
-              </a:extLst>
-            </p:cNvPr>
-            <p:cNvPicPr>
-              <a:picLocks noChangeAspect="1"/>
-            </p:cNvPicPr>
-            <p:nvPr/>
-          </p:nvPicPr>
-          <p:blipFill rotWithShape="1">
-            <a:blip r:embed="rId2">
-              <a:extLst>
-                <a:ext uri="{28A0092B-C50C-407E-A947-70E740481C1C}">
-                  <a14:useLocalDpi xmlns:a14="http://schemas.microsoft.com/office/drawing/2010/main" val="0"/>
-                </a:ext>
-              </a:extLst>
-            </a:blip>
-            <a:srcRect t="-872" r="79121" b="59478"/>
-            <a:stretch/>
-          </p:blipFill>
-          <p:spPr>
-            <a:xfrm>
-              <a:off x="7494192" y="3362824"/>
-              <a:ext cx="1718235" cy="2838824"/>
-            </a:xfrm>
-            <a:prstGeom prst="rect">
-              <a:avLst/>
-            </a:prstGeom>
-          </p:spPr>
-        </p:pic>
-        <p:pic>
-          <p:nvPicPr>
-            <p:cNvPr id="7" name="Picture 6">
-              <a:extLst>
-                <a:ext uri="{FF2B5EF4-FFF2-40B4-BE49-F238E27FC236}">
-                  <a16:creationId xmlns:a16="http://schemas.microsoft.com/office/drawing/2014/main" id="{866792F8-11FC-43CC-BE33-516C91875EF9}"/>
-                </a:ext>
-              </a:extLst>
-            </p:cNvPr>
-            <p:cNvPicPr>
-              <a:picLocks noChangeAspect="1"/>
-            </p:cNvPicPr>
-            <p:nvPr/>
-          </p:nvPicPr>
-          <p:blipFill rotWithShape="1">
-            <a:blip r:embed="rId2">
-              <a:extLst>
-                <a:ext uri="{28A0092B-C50C-407E-A947-70E740481C1C}">
-                  <a14:useLocalDpi xmlns:a14="http://schemas.microsoft.com/office/drawing/2010/main" val="0"/>
-                </a:ext>
-              </a:extLst>
-            </a:blip>
-            <a:srcRect l="763" t="49499" r="82534" b="9019"/>
-            <a:stretch/>
-          </p:blipFill>
-          <p:spPr>
-            <a:xfrm>
-              <a:off x="5875353" y="3394180"/>
-              <a:ext cx="1374588" cy="2844800"/>
-            </a:xfrm>
-            <a:prstGeom prst="rect">
-              <a:avLst/>
-            </a:prstGeom>
-          </p:spPr>
-        </p:pic>
-        <p:pic>
-          <p:nvPicPr>
-            <p:cNvPr id="8" name="Picture 7">
-              <a:extLst>
-                <a:ext uri="{FF2B5EF4-FFF2-40B4-BE49-F238E27FC236}">
-                  <a16:creationId xmlns:a16="http://schemas.microsoft.com/office/drawing/2014/main" id="{26E84290-4AB8-4F8C-9EEA-B89C0679A160}"/>
-                </a:ext>
-              </a:extLst>
-            </p:cNvPr>
-            <p:cNvPicPr>
-              <a:picLocks noChangeAspect="1"/>
-            </p:cNvPicPr>
-            <p:nvPr/>
-          </p:nvPicPr>
-          <p:blipFill rotWithShape="1">
-            <a:blip r:embed="rId2">
-              <a:extLst>
-                <a:ext uri="{28A0092B-C50C-407E-A947-70E740481C1C}">
-                  <a14:useLocalDpi xmlns:a14="http://schemas.microsoft.com/office/drawing/2010/main" val="0"/>
-                </a:ext>
-              </a:extLst>
-            </a:blip>
-            <a:srcRect l="34752" t="93931" r="48439" b="3590"/>
-            <a:stretch/>
-          </p:blipFill>
-          <p:spPr>
-            <a:xfrm>
-              <a:off x="3247292" y="3698631"/>
-              <a:ext cx="1383323" cy="169984"/>
-            </a:xfrm>
-            <a:prstGeom prst="rect">
-              <a:avLst/>
-            </a:prstGeom>
-          </p:spPr>
-        </p:pic>
-        <p:pic>
-          <p:nvPicPr>
-            <p:cNvPr id="10" name="Picture 9">
-              <a:extLst>
-                <a:ext uri="{FF2B5EF4-FFF2-40B4-BE49-F238E27FC236}">
-                  <a16:creationId xmlns:a16="http://schemas.microsoft.com/office/drawing/2014/main" id="{A9B60580-E748-489A-8CAF-C585B4780EA1}"/>
-                </a:ext>
-              </a:extLst>
-            </p:cNvPr>
-            <p:cNvPicPr>
-              <a:picLocks noChangeAspect="1"/>
-            </p:cNvPicPr>
-            <p:nvPr/>
-          </p:nvPicPr>
-          <p:blipFill rotWithShape="1">
-            <a:blip r:embed="rId2">
-              <a:extLst>
-                <a:ext uri="{28A0092B-C50C-407E-A947-70E740481C1C}">
-                  <a14:useLocalDpi xmlns:a14="http://schemas.microsoft.com/office/drawing/2010/main" val="0"/>
-                </a:ext>
-              </a:extLst>
-            </a:blip>
-            <a:srcRect l="20507" b="57497"/>
-            <a:stretch/>
-          </p:blipFill>
-          <p:spPr>
-            <a:xfrm>
-              <a:off x="2595031" y="426076"/>
-              <a:ext cx="6541937" cy="2914884"/>
-            </a:xfrm>
-            <a:prstGeom prst="rect">
-              <a:avLst/>
-            </a:prstGeom>
-          </p:spPr>
-        </p:pic>
-        <p:grpSp>
-          <p:nvGrpSpPr>
-            <p:cNvPr id="12" name="Group 11">
-              <a:extLst>
-                <a:ext uri="{FF2B5EF4-FFF2-40B4-BE49-F238E27FC236}">
-                  <a16:creationId xmlns:a16="http://schemas.microsoft.com/office/drawing/2014/main" id="{14137985-F527-48A5-BF41-3F051750C6F3}"/>
+                  <a16:creationId xmlns:a16="http://schemas.microsoft.com/office/drawing/2014/main" id="{EA6212DD-1CBF-41B5-9653-E2F46A97AB10}"/>
                 </a:ext>
               </a:extLst>
             </p:cNvPr>
@@ -3546,18 +3371,18 @@
           </p:nvGrpSpPr>
           <p:grpSpPr>
             <a:xfrm>
-              <a:off x="4528195" y="2322709"/>
-              <a:ext cx="1006331" cy="492289"/>
-              <a:chOff x="118622" y="1810752"/>
-              <a:chExt cx="1006331" cy="492289"/>
+              <a:off x="2444261" y="426076"/>
+              <a:ext cx="6768166" cy="5812904"/>
+              <a:chOff x="2444261" y="426076"/>
+              <a:chExt cx="6768166" cy="5812904"/>
             </a:xfrm>
           </p:grpSpPr>
           <p:pic>
             <p:nvPicPr>
-              <p:cNvPr id="9" name="Picture 8">
+              <p:cNvPr id="6" name="Picture 5">
                 <a:extLst>
                   <a:ext uri="{FF2B5EF4-FFF2-40B4-BE49-F238E27FC236}">
-                    <a16:creationId xmlns:a16="http://schemas.microsoft.com/office/drawing/2014/main" id="{2CFB3496-1820-4DA6-B55D-632DC6FDF742}"/>
+                    <a16:creationId xmlns:a16="http://schemas.microsoft.com/office/drawing/2014/main" id="{D6D8D7A7-F76C-4CE9-B531-69E784B2F128}"/>
                   </a:ext>
                 </a:extLst>
               </p:cNvPr>
@@ -3574,13 +3399,13 @@
                   </a:ext>
                 </a:extLst>
               </a:blip>
-              <a:srcRect l="42706" t="42732" r="45227" b="52559"/>
+              <a:srcRect l="20507" t="50000" b="11625"/>
               <a:stretch/>
             </p:blipFill>
             <p:spPr>
               <a:xfrm>
-                <a:off x="131885" y="1980116"/>
-                <a:ext cx="993068" cy="322925"/>
+                <a:off x="2444261" y="3429000"/>
+                <a:ext cx="6541937" cy="2631830"/>
               </a:xfrm>
               <a:prstGeom prst="rect">
                 <a:avLst/>
@@ -3589,10 +3414,10 @@
           </p:pic>
           <p:pic>
             <p:nvPicPr>
-              <p:cNvPr id="11" name="Picture 10">
+              <p:cNvPr id="5" name="Picture 4">
                 <a:extLst>
                   <a:ext uri="{FF2B5EF4-FFF2-40B4-BE49-F238E27FC236}">
-                    <a16:creationId xmlns:a16="http://schemas.microsoft.com/office/drawing/2014/main" id="{1E56CA45-3D2A-4AB5-8A66-57CA70108961}"/>
+                    <a16:creationId xmlns:a16="http://schemas.microsoft.com/office/drawing/2014/main" id="{BDC1BB22-F5E4-4324-AD23-19F6E80AED6A}"/>
                   </a:ext>
                 </a:extLst>
               </p:cNvPr>
@@ -3609,20 +3434,356 @@
                   </a:ext>
                 </a:extLst>
               </a:blip>
-              <a:srcRect l="30550" t="43545" r="57294" b="52493"/>
+              <a:srcRect t="-872" r="79121" b="59478"/>
               <a:stretch/>
             </p:blipFill>
             <p:spPr>
               <a:xfrm>
-                <a:off x="118622" y="1810752"/>
-                <a:ext cx="1000315" cy="271635"/>
+                <a:off x="7494192" y="3362824"/>
+                <a:ext cx="1718235" cy="2838824"/>
               </a:xfrm>
               <a:prstGeom prst="rect">
                 <a:avLst/>
               </a:prstGeom>
             </p:spPr>
           </p:pic>
+          <p:pic>
+            <p:nvPicPr>
+              <p:cNvPr id="7" name="Picture 6">
+                <a:extLst>
+                  <a:ext uri="{FF2B5EF4-FFF2-40B4-BE49-F238E27FC236}">
+                    <a16:creationId xmlns:a16="http://schemas.microsoft.com/office/drawing/2014/main" id="{866792F8-11FC-43CC-BE33-516C91875EF9}"/>
+                  </a:ext>
+                </a:extLst>
+              </p:cNvPr>
+              <p:cNvPicPr>
+                <a:picLocks noChangeAspect="1"/>
+              </p:cNvPicPr>
+              <p:nvPr/>
+            </p:nvPicPr>
+            <p:blipFill rotWithShape="1">
+              <a:blip r:embed="rId2">
+                <a:extLst>
+                  <a:ext uri="{28A0092B-C50C-407E-A947-70E740481C1C}">
+                    <a14:useLocalDpi xmlns:a14="http://schemas.microsoft.com/office/drawing/2010/main" val="0"/>
+                  </a:ext>
+                </a:extLst>
+              </a:blip>
+              <a:srcRect l="763" t="49499" r="82534" b="9019"/>
+              <a:stretch/>
+            </p:blipFill>
+            <p:spPr>
+              <a:xfrm>
+                <a:off x="5875353" y="3394180"/>
+                <a:ext cx="1374588" cy="2844800"/>
+              </a:xfrm>
+              <a:prstGeom prst="rect">
+                <a:avLst/>
+              </a:prstGeom>
+            </p:spPr>
+          </p:pic>
+          <p:pic>
+            <p:nvPicPr>
+              <p:cNvPr id="8" name="Picture 7">
+                <a:extLst>
+                  <a:ext uri="{FF2B5EF4-FFF2-40B4-BE49-F238E27FC236}">
+                    <a16:creationId xmlns:a16="http://schemas.microsoft.com/office/drawing/2014/main" id="{26E84290-4AB8-4F8C-9EEA-B89C0679A160}"/>
+                  </a:ext>
+                </a:extLst>
+              </p:cNvPr>
+              <p:cNvPicPr>
+                <a:picLocks noChangeAspect="1"/>
+              </p:cNvPicPr>
+              <p:nvPr/>
+            </p:nvPicPr>
+            <p:blipFill rotWithShape="1">
+              <a:blip r:embed="rId2">
+                <a:extLst>
+                  <a:ext uri="{28A0092B-C50C-407E-A947-70E740481C1C}">
+                    <a14:useLocalDpi xmlns:a14="http://schemas.microsoft.com/office/drawing/2010/main" val="0"/>
+                  </a:ext>
+                </a:extLst>
+              </a:blip>
+              <a:srcRect l="34752" t="93931" r="48439" b="3590"/>
+              <a:stretch/>
+            </p:blipFill>
+            <p:spPr>
+              <a:xfrm>
+                <a:off x="3247292" y="3698631"/>
+                <a:ext cx="1383323" cy="169984"/>
+              </a:xfrm>
+              <a:prstGeom prst="rect">
+                <a:avLst/>
+              </a:prstGeom>
+            </p:spPr>
+          </p:pic>
+          <p:pic>
+            <p:nvPicPr>
+              <p:cNvPr id="10" name="Picture 9">
+                <a:extLst>
+                  <a:ext uri="{FF2B5EF4-FFF2-40B4-BE49-F238E27FC236}">
+                    <a16:creationId xmlns:a16="http://schemas.microsoft.com/office/drawing/2014/main" id="{A9B60580-E748-489A-8CAF-C585B4780EA1}"/>
+                  </a:ext>
+                </a:extLst>
+              </p:cNvPr>
+              <p:cNvPicPr>
+                <a:picLocks noChangeAspect="1"/>
+              </p:cNvPicPr>
+              <p:nvPr/>
+            </p:nvPicPr>
+            <p:blipFill rotWithShape="1">
+              <a:blip r:embed="rId2">
+                <a:extLst>
+                  <a:ext uri="{28A0092B-C50C-407E-A947-70E740481C1C}">
+                    <a14:useLocalDpi xmlns:a14="http://schemas.microsoft.com/office/drawing/2010/main" val="0"/>
+                  </a:ext>
+                </a:extLst>
+              </a:blip>
+              <a:srcRect l="20507" b="57497"/>
+              <a:stretch/>
+            </p:blipFill>
+            <p:spPr>
+              <a:xfrm>
+                <a:off x="2595031" y="426076"/>
+                <a:ext cx="6541937" cy="2914884"/>
+              </a:xfrm>
+              <a:prstGeom prst="rect">
+                <a:avLst/>
+              </a:prstGeom>
+            </p:spPr>
+          </p:pic>
+          <p:grpSp>
+            <p:nvGrpSpPr>
+              <p:cNvPr id="12" name="Group 11">
+                <a:extLst>
+                  <a:ext uri="{FF2B5EF4-FFF2-40B4-BE49-F238E27FC236}">
+                    <a16:creationId xmlns:a16="http://schemas.microsoft.com/office/drawing/2014/main" id="{14137985-F527-48A5-BF41-3F051750C6F3}"/>
+                  </a:ext>
+                </a:extLst>
+              </p:cNvPr>
+              <p:cNvGrpSpPr/>
+              <p:nvPr/>
+            </p:nvGrpSpPr>
+            <p:grpSpPr>
+              <a:xfrm>
+                <a:off x="4528195" y="2322709"/>
+                <a:ext cx="1006331" cy="492289"/>
+                <a:chOff x="118622" y="1810752"/>
+                <a:chExt cx="1006331" cy="492289"/>
+              </a:xfrm>
+            </p:grpSpPr>
+            <p:pic>
+              <p:nvPicPr>
+                <p:cNvPr id="9" name="Picture 8">
+                  <a:extLst>
+                    <a:ext uri="{FF2B5EF4-FFF2-40B4-BE49-F238E27FC236}">
+                      <a16:creationId xmlns:a16="http://schemas.microsoft.com/office/drawing/2014/main" id="{2CFB3496-1820-4DA6-B55D-632DC6FDF742}"/>
+                    </a:ext>
+                  </a:extLst>
+                </p:cNvPr>
+                <p:cNvPicPr>
+                  <a:picLocks noChangeAspect="1"/>
+                </p:cNvPicPr>
+                <p:nvPr/>
+              </p:nvPicPr>
+              <p:blipFill rotWithShape="1">
+                <a:blip r:embed="rId2">
+                  <a:extLst>
+                    <a:ext uri="{28A0092B-C50C-407E-A947-70E740481C1C}">
+                      <a14:useLocalDpi xmlns:a14="http://schemas.microsoft.com/office/drawing/2010/main" val="0"/>
+                    </a:ext>
+                  </a:extLst>
+                </a:blip>
+                <a:srcRect l="42706" t="42732" r="45227" b="52559"/>
+                <a:stretch/>
+              </p:blipFill>
+              <p:spPr>
+                <a:xfrm>
+                  <a:off x="131885" y="1980116"/>
+                  <a:ext cx="993068" cy="322925"/>
+                </a:xfrm>
+                <a:prstGeom prst="rect">
+                  <a:avLst/>
+                </a:prstGeom>
+              </p:spPr>
+            </p:pic>
+            <p:pic>
+              <p:nvPicPr>
+                <p:cNvPr id="11" name="Picture 10">
+                  <a:extLst>
+                    <a:ext uri="{FF2B5EF4-FFF2-40B4-BE49-F238E27FC236}">
+                      <a16:creationId xmlns:a16="http://schemas.microsoft.com/office/drawing/2014/main" id="{1E56CA45-3D2A-4AB5-8A66-57CA70108961}"/>
+                    </a:ext>
+                  </a:extLst>
+                </p:cNvPr>
+                <p:cNvPicPr>
+                  <a:picLocks noChangeAspect="1"/>
+                </p:cNvPicPr>
+                <p:nvPr/>
+              </p:nvPicPr>
+              <p:blipFill rotWithShape="1">
+                <a:blip r:embed="rId2">
+                  <a:extLst>
+                    <a:ext uri="{28A0092B-C50C-407E-A947-70E740481C1C}">
+                      <a14:useLocalDpi xmlns:a14="http://schemas.microsoft.com/office/drawing/2010/main" val="0"/>
+                    </a:ext>
+                  </a:extLst>
+                </a:blip>
+                <a:srcRect l="30550" t="43545" r="57294" b="52493"/>
+                <a:stretch/>
+              </p:blipFill>
+              <p:spPr>
+                <a:xfrm>
+                  <a:off x="118622" y="1810752"/>
+                  <a:ext cx="1000315" cy="271635"/>
+                </a:xfrm>
+                <a:prstGeom prst="rect">
+                  <a:avLst/>
+                </a:prstGeom>
+              </p:spPr>
+            </p:pic>
+          </p:grpSp>
         </p:grpSp>
+        <p:sp>
+          <p:nvSpPr>
+            <p:cNvPr id="2" name="TextBox 1">
+              <a:extLst>
+                <a:ext uri="{FF2B5EF4-FFF2-40B4-BE49-F238E27FC236}">
+                  <a16:creationId xmlns:a16="http://schemas.microsoft.com/office/drawing/2014/main" id="{D748C7FA-75B8-48CB-9F32-EB7ABD2CD2EE}"/>
+                </a:ext>
+              </a:extLst>
+            </p:cNvPr>
+            <p:cNvSpPr txBox="1"/>
+            <p:nvPr/>
+          </p:nvSpPr>
+          <p:spPr>
+            <a:xfrm>
+              <a:off x="2444260" y="442287"/>
+              <a:ext cx="468923" cy="338554"/>
+            </a:xfrm>
+            <a:prstGeom prst="rect">
+              <a:avLst/>
+            </a:prstGeom>
+            <a:noFill/>
+          </p:spPr>
+          <p:txBody>
+            <a:bodyPr wrap="square" rtlCol="0">
+              <a:spAutoFit/>
+            </a:bodyPr>
+            <a:lstStyle/>
+            <a:p>
+              <a:r>
+                <a:rPr lang="en-US" sz="1600" b="1" dirty="0"/>
+                <a:t>A</a:t>
+              </a:r>
+            </a:p>
+          </p:txBody>
+        </p:sp>
+        <p:sp>
+          <p:nvSpPr>
+            <p:cNvPr id="14" name="TextBox 13">
+              <a:extLst>
+                <a:ext uri="{FF2B5EF4-FFF2-40B4-BE49-F238E27FC236}">
+                  <a16:creationId xmlns:a16="http://schemas.microsoft.com/office/drawing/2014/main" id="{D875414B-8805-4245-84AC-092450D4D59A}"/>
+                </a:ext>
+              </a:extLst>
+            </p:cNvPr>
+            <p:cNvSpPr txBox="1"/>
+            <p:nvPr/>
+          </p:nvSpPr>
+          <p:spPr>
+            <a:xfrm>
+              <a:off x="5875353" y="442287"/>
+              <a:ext cx="468923" cy="338554"/>
+            </a:xfrm>
+            <a:prstGeom prst="rect">
+              <a:avLst/>
+            </a:prstGeom>
+            <a:noFill/>
+          </p:spPr>
+          <p:txBody>
+            <a:bodyPr wrap="square" rtlCol="0">
+              <a:spAutoFit/>
+            </a:bodyPr>
+            <a:lstStyle/>
+            <a:p>
+              <a:r>
+                <a:rPr lang="en-US" sz="1600" b="1" dirty="0"/>
+                <a:t>B</a:t>
+              </a:r>
+            </a:p>
+          </p:txBody>
+        </p:sp>
+        <p:sp>
+          <p:nvSpPr>
+            <p:cNvPr id="15" name="TextBox 14">
+              <a:extLst>
+                <a:ext uri="{FF2B5EF4-FFF2-40B4-BE49-F238E27FC236}">
+                  <a16:creationId xmlns:a16="http://schemas.microsoft.com/office/drawing/2014/main" id="{5C186CE4-1074-4039-9A77-145B59204C13}"/>
+                </a:ext>
+              </a:extLst>
+            </p:cNvPr>
+            <p:cNvSpPr txBox="1"/>
+            <p:nvPr/>
+          </p:nvSpPr>
+          <p:spPr>
+            <a:xfrm>
+              <a:off x="2444261" y="3305768"/>
+              <a:ext cx="468923" cy="338554"/>
+            </a:xfrm>
+            <a:prstGeom prst="rect">
+              <a:avLst/>
+            </a:prstGeom>
+            <a:noFill/>
+          </p:spPr>
+          <p:txBody>
+            <a:bodyPr wrap="square" rtlCol="0">
+              <a:spAutoFit/>
+            </a:bodyPr>
+            <a:lstStyle/>
+            <a:p>
+              <a:r>
+                <a:rPr lang="en-US" sz="1600" b="1" dirty="0"/>
+                <a:t>C</a:t>
+              </a:r>
+            </a:p>
+          </p:txBody>
+        </p:sp>
+        <p:sp>
+          <p:nvSpPr>
+            <p:cNvPr id="16" name="TextBox 15">
+              <a:extLst>
+                <a:ext uri="{FF2B5EF4-FFF2-40B4-BE49-F238E27FC236}">
+                  <a16:creationId xmlns:a16="http://schemas.microsoft.com/office/drawing/2014/main" id="{03463AB7-C3A3-4982-AC51-B38BAD9244E5}"/>
+                </a:ext>
+              </a:extLst>
+            </p:cNvPr>
+            <p:cNvSpPr txBox="1"/>
+            <p:nvPr/>
+          </p:nvSpPr>
+          <p:spPr>
+            <a:xfrm>
+              <a:off x="5861538" y="3305768"/>
+              <a:ext cx="468923" cy="338554"/>
+            </a:xfrm>
+            <a:prstGeom prst="rect">
+              <a:avLst/>
+            </a:prstGeom>
+            <a:noFill/>
+          </p:spPr>
+          <p:txBody>
+            <a:bodyPr wrap="square" rtlCol="0">
+              <a:spAutoFit/>
+            </a:bodyPr>
+            <a:lstStyle/>
+            <a:p>
+              <a:r>
+                <a:rPr lang="en-US" sz="1600" b="1" dirty="0"/>
+                <a:t>D</a:t>
+              </a:r>
+            </a:p>
+          </p:txBody>
+        </p:sp>
       </p:grpSp>
     </p:spTree>
     <p:extLst>

</xml_diff>